<commit_message>
Added additional Java vs Js differences.
</commit_message>
<xml_diff>
--- a/docs/thesis/ThesisDefensePresentation -2022-11-03.pptx
+++ b/docs/thesis/ThesisDefensePresentation -2022-11-03.pptx
@@ -2447,7 +2447,7 @@
           </a:lstStyle>
           <a:p>
             <a:fld id="{F1435B39-2F1E-4ABB-97C4-687DFF3E5CAB}" type="datetimeFigureOut">
-              <a:t>11/2/2022</a:t>
+              <a:t>11/8/2022</a:t>
             </a:fld>
             <a:endParaRPr lang="en-US"/>
           </a:p>
@@ -3089,7 +3089,7 @@
               <a:defRPr/>
             </a:pPr>
             <a:r>
-              <a:rPr lang="en-US">
+              <a:rPr lang="en-US" dirty="0">
                 <a:cs typeface="Calibri"/>
               </a:rPr>
               <a:t>Now I am going to discuss what major changes and considerations we had to make to create JsDiffer</a:t>
@@ -3113,7 +3113,7 @@
               <a:tabLst/>
               <a:defRPr/>
             </a:pPr>
-            <a:endParaRPr lang="en-US">
+            <a:endParaRPr lang="en-US" dirty="0">
               <a:cs typeface="Calibri"/>
             </a:endParaRPr>
           </a:p>
@@ -3136,7 +3136,7 @@
               <a:defRPr/>
             </a:pPr>
             <a:r>
-              <a:rPr lang="en-US">
+              <a:rPr lang="en-US" dirty="0">
                 <a:cs typeface="Calibri"/>
               </a:rPr>
               <a:t>-  First, JavaScript has functional expressions</a:t>
@@ -3161,10 +3161,10 @@
               <a:defRPr/>
             </a:pPr>
             <a:r>
-              <a:rPr lang="en-US">
-                <a:cs typeface="Calibri"/>
-              </a:rPr>
-              <a:t>They are basically function declarations that are used in statement, Similar to Java lambda, </a:t>
+              <a:rPr lang="en-US" dirty="0">
+                <a:cs typeface="Calibri"/>
+              </a:rPr>
+              <a:t>They are basically function declarations that are used in statement, Like Java lambda, </a:t>
             </a:r>
           </a:p>
           <a:p>
@@ -3185,7 +3185,7 @@
               <a:tabLst/>
               <a:defRPr/>
             </a:pPr>
-            <a:endParaRPr lang="en-US">
+            <a:endParaRPr lang="en-US" dirty="0">
               <a:cs typeface="Calibri"/>
             </a:endParaRPr>
           </a:p>
@@ -3208,7 +3208,7 @@
               <a:defRPr/>
             </a:pPr>
             <a:r>
-              <a:rPr lang="en-US">
+              <a:rPr lang="en-US" dirty="0">
                 <a:cs typeface="Calibri"/>
               </a:rPr>
               <a:t>Here the first statements pair in line1-4 are not textually identical</a:t>
@@ -3220,20 +3220,11 @@
               <a:buChar char="-"/>
             </a:pPr>
             <a:r>
-              <a:rPr lang="en-US">
-                <a:cs typeface="Calibri"/>
-              </a:rPr>
-              <a:t>RefactoringMiner approach Takes subexpression of a statements for example the type, variables, literals, Function Calle </a:t>
-            </a:r>
-            <a:r>
-              <a:rPr lang="en-US" err="1">
-                <a:cs typeface="Calibri"/>
-              </a:rPr>
-              <a:t>etcs</a:t>
-            </a:r>
-            <a:endParaRPr lang="en-US">
-              <a:cs typeface="Calibri"/>
-            </a:endParaRPr>
+              <a:rPr lang="en-US" dirty="0">
+                <a:cs typeface="Calibri"/>
+              </a:rPr>
+              <a:t>RefactoringMiner approach Takes subexpression of a statements for example the type, variables, literals, Function Calls etc.</a:t>
+            </a:r>
           </a:p>
           <a:p>
             <a:pPr marL="0" indent="0">
@@ -3241,7 +3232,7 @@
               <a:buNone/>
             </a:pPr>
             <a:r>
-              <a:rPr lang="en-US">
+              <a:rPr lang="en-US" dirty="0">
                 <a:cs typeface="Calibri"/>
               </a:rPr>
               <a:t> And use every combination to perform a syntactically appropriate replacement. (types with types, variables with variables or invocation)</a:t>
@@ -3252,7 +3243,7 @@
               <a:buFontTx/>
               <a:buNone/>
             </a:pPr>
-            <a:endParaRPr lang="en-US">
+            <a:endParaRPr lang="en-US" dirty="0">
               <a:cs typeface="Calibri"/>
             </a:endParaRPr>
           </a:p>
@@ -3262,7 +3253,7 @@
               <a:buNone/>
             </a:pPr>
             <a:r>
-              <a:rPr lang="en-US">
+              <a:rPr lang="en-US" dirty="0">
                 <a:cs typeface="Calibri"/>
               </a:rPr>
               <a:t>Here</a:t>
@@ -3274,7 +3265,7 @@
               <a:buNone/>
             </a:pPr>
             <a:r>
-              <a:rPr lang="en-US">
+              <a:rPr lang="en-US" dirty="0">
                 <a:cs typeface="Calibri"/>
               </a:rPr>
               <a:t> - Variable Count is removed and counter is added</a:t>
@@ -3299,7 +3290,7 @@
               <a:defRPr/>
             </a:pPr>
             <a:r>
-              <a:rPr lang="en-US">
+              <a:rPr lang="en-US" dirty="0">
                 <a:cs typeface="Calibri"/>
               </a:rPr>
               <a:t>RefactoringMiner perform String replacement on this statement in version 1 by changing</a:t>
@@ -3324,7 +3315,7 @@
               <a:defRPr/>
             </a:pPr>
             <a:r>
-              <a:rPr lang="en-US">
+              <a:rPr lang="en-US" dirty="0">
                 <a:cs typeface="Calibri"/>
               </a:rPr>
               <a:t> all the occurrence of count to counter and then measures the  normalized Levenshtein distance which</a:t>
@@ -3349,7 +3340,7 @@
               <a:defRPr/>
             </a:pPr>
             <a:r>
-              <a:rPr lang="en-US">
+              <a:rPr lang="en-US" dirty="0">
                 <a:cs typeface="Calibri"/>
               </a:rPr>
               <a:t>Essentially represents the number of edits it takes to make two Strings identical</a:t>
@@ -3373,7 +3364,7 @@
               <a:tabLst/>
               <a:defRPr/>
             </a:pPr>
-            <a:endParaRPr lang="en-US">
+            <a:endParaRPr lang="en-US" dirty="0">
               <a:cs typeface="Calibri"/>
             </a:endParaRPr>
           </a:p>
@@ -3396,7 +3387,7 @@
               <a:defRPr/>
             </a:pPr>
             <a:r>
-              <a:rPr lang="en-US">
+              <a:rPr lang="en-US" dirty="0">
                 <a:cs typeface="Calibri"/>
               </a:rPr>
               <a:t>We cannot do that for JS as the strings can be huge and can represent whole program instead of a lambda expression with few lines of code</a:t>
@@ -3421,7 +3412,7 @@
               <a:defRPr/>
             </a:pPr>
             <a:r>
-              <a:rPr lang="en-US">
+              <a:rPr lang="en-US" dirty="0">
                 <a:cs typeface="Calibri"/>
               </a:rPr>
               <a:t>In practices we found that in some cases it took 3 hours or more just to calculate Levenshtein between two strings of JavaScript code</a:t>
@@ -3445,7 +3436,7 @@
               <a:tabLst/>
               <a:defRPr/>
             </a:pPr>
-            <a:endParaRPr lang="en-US">
+            <a:endParaRPr lang="en-US" dirty="0">
               <a:cs typeface="Calibri"/>
             </a:endParaRPr>
           </a:p>
@@ -3468,7 +3459,7 @@
               <a:defRPr/>
             </a:pPr>
             <a:r>
-              <a:rPr lang="en-US">
+              <a:rPr lang="en-US" dirty="0">
                 <a:cs typeface="Calibri"/>
               </a:rPr>
               <a:t>Therefore, the solution was to match functional expressions separately In  a round based fashion before matching the other part of the statements </a:t>
@@ -3479,7 +3470,7 @@
               <a:buFontTx/>
               <a:buNone/>
             </a:pPr>
-            <a:endParaRPr lang="en-US">
+            <a:endParaRPr lang="en-US" dirty="0">
               <a:cs typeface="Calibri"/>
             </a:endParaRPr>
           </a:p>
@@ -3708,34 +3699,10 @@
               <a:buChar char="-"/>
             </a:pPr>
             <a:r>
-              <a:rPr lang="en-US">
-                <a:cs typeface="Calibri"/>
-              </a:rPr>
-              <a:t>In </a:t>
-            </a:r>
-            <a:r>
-              <a:rPr lang="en-US" err="1">
-                <a:cs typeface="Calibri"/>
-              </a:rPr>
-              <a:t>JavaSscript</a:t>
-            </a:r>
-            <a:r>
-              <a:rPr lang="en-US">
-                <a:cs typeface="Calibri"/>
-              </a:rPr>
-              <a:t> Functions or </a:t>
-            </a:r>
-            <a:r>
-              <a:rPr lang="en-US" err="1">
-                <a:cs typeface="Calibri"/>
-              </a:rPr>
-              <a:t>classe</a:t>
-            </a:r>
-            <a:r>
-              <a:rPr lang="en-US">
-                <a:cs typeface="Calibri"/>
-              </a:rPr>
-              <a:t> can be declared anywhere and we have found it’s common practice to declare functions inside of a function</a:t>
+              <a:rPr lang="en-US" dirty="0">
+                <a:cs typeface="Calibri"/>
+              </a:rPr>
+              <a:t>In JavaScript Functions or classes can be declared anywhere and we have found it’s common practice to declare functions inside of a function</a:t>
             </a:r>
           </a:p>
           <a:p>
@@ -3744,7 +3711,7 @@
               <a:buChar char="-"/>
             </a:pPr>
             <a:r>
-              <a:rPr lang="en-US">
+              <a:rPr lang="en-US" dirty="0">
                 <a:cs typeface="Calibri"/>
               </a:rPr>
               <a:t>This is different than refactoring miner which does not consider that method can have other method declaration</a:t>
@@ -3755,7 +3722,7 @@
               <a:buFontTx/>
               <a:buChar char="-"/>
             </a:pPr>
-            <a:endParaRPr lang="en-US">
+            <a:endParaRPr lang="en-US" dirty="0">
               <a:cs typeface="Calibri"/>
             </a:endParaRPr>
           </a:p>
@@ -3765,22 +3732,10 @@
               <a:buChar char="-"/>
             </a:pPr>
             <a:r>
-              <a:rPr lang="en-US">
-                <a:cs typeface="Calibri"/>
-              </a:rPr>
-              <a:t>Here the topmost function in line 1 contains only two functions but no other </a:t>
-            </a:r>
-            <a:r>
-              <a:rPr lang="en-US" err="1">
-                <a:cs typeface="Calibri"/>
-              </a:rPr>
-              <a:t>satements</a:t>
-            </a:r>
-            <a:r>
-              <a:rPr lang="en-US">
-                <a:cs typeface="Calibri"/>
-              </a:rPr>
-              <a:t>. </a:t>
+              <a:rPr lang="en-US" dirty="0">
+                <a:cs typeface="Calibri"/>
+              </a:rPr>
+              <a:t>Here the topmost function in line 1 contains only two functions but no other statements. </a:t>
             </a:r>
           </a:p>
           <a:p>
@@ -3789,7 +3744,7 @@
               <a:buChar char="-"/>
             </a:pPr>
             <a:r>
-              <a:rPr lang="en-US">
+              <a:rPr lang="en-US" dirty="0">
                 <a:cs typeface="Calibri"/>
               </a:rPr>
               <a:t>We matched them recursively and consider them when matching this topmost function.</a:t>
@@ -3801,7 +3756,7 @@
               <a:buChar char="-"/>
             </a:pPr>
             <a:r>
-              <a:rPr lang="en-US">
+              <a:rPr lang="en-US" dirty="0">
                 <a:cs typeface="Calibri"/>
               </a:rPr>
               <a:t>So, our tool supports potentially unlimited nesting depth which is different from RefactoringMiner which only considers maybe 2-3 level of nesting depth</a:t>
@@ -3812,7 +3767,7 @@
               <a:buFontTx/>
               <a:buChar char="-"/>
             </a:pPr>
-            <a:endParaRPr lang="en-US">
+            <a:endParaRPr lang="en-US" dirty="0">
               <a:cs typeface="Calibri"/>
             </a:endParaRPr>
           </a:p>
@@ -4096,20 +4051,20 @@
           <a:lstStyle/>
           <a:p>
             <a:r>
-              <a:rPr lang="en-US">
+              <a:rPr lang="en-US" dirty="0">
                 <a:cs typeface="Calibri"/>
               </a:rPr>
               <a:t>This example shows object expressions which are like java class declaration</a:t>
             </a:r>
           </a:p>
           <a:p>
-            <a:endParaRPr lang="en-US">
+            <a:endParaRPr lang="en-US" dirty="0">
               <a:cs typeface="Calibri"/>
             </a:endParaRPr>
           </a:p>
           <a:p>
             <a:r>
-              <a:rPr lang="en-US">
+              <a:rPr lang="en-US" dirty="0">
                 <a:cs typeface="Calibri"/>
               </a:rPr>
               <a:t>1.</a:t>
@@ -4121,7 +4076,7 @@
               <a:buChar char="-"/>
             </a:pPr>
             <a:r>
-              <a:rPr lang="en-US">
+              <a:rPr lang="en-US" dirty="0">
                 <a:cs typeface="Calibri"/>
               </a:rPr>
               <a:t>In the parser we convert them as Function Declaration / Expression, </a:t>
@@ -4133,7 +4088,7 @@
               <a:buChar char="-"/>
             </a:pPr>
             <a:r>
-              <a:rPr lang="en-US">
+              <a:rPr lang="en-US" dirty="0">
                 <a:cs typeface="Calibri"/>
               </a:rPr>
               <a:t>Attributes are modeled as statements. Notice the difference in colon for attribute assignment instead of equal sign</a:t>
@@ -4144,7 +4099,7 @@
               <a:buFontTx/>
               <a:buChar char="-"/>
             </a:pPr>
-            <a:endParaRPr lang="en-US">
+            <a:endParaRPr lang="en-US" dirty="0">
               <a:cs typeface="Calibri"/>
             </a:endParaRPr>
           </a:p>
@@ -4154,7 +4109,7 @@
               <a:buNone/>
             </a:pPr>
             <a:r>
-              <a:rPr lang="en-US">
+              <a:rPr lang="en-US" dirty="0">
                 <a:cs typeface="Calibri"/>
               </a:rPr>
               <a:t>2.</a:t>
@@ -4166,7 +4121,7 @@
               <a:buChar char="-"/>
             </a:pPr>
             <a:r>
-              <a:rPr lang="en-US">
+              <a:rPr lang="en-US" dirty="0">
                 <a:cs typeface="Calibri"/>
               </a:rPr>
               <a:t>As we can see the nesting depth is quite large, for example, the first line is a Function Expression,</a:t>
@@ -4178,19 +4133,19 @@
               <a:buChar char="-"/>
             </a:pPr>
             <a:r>
-              <a:rPr lang="en-US">
+              <a:rPr lang="en-US" dirty="0">
                 <a:cs typeface="Calibri"/>
               </a:rPr>
               <a:t> then we have another function expression on line 2,  </a:t>
             </a:r>
             <a:r>
-              <a:rPr lang="en-US" err="1">
+              <a:rPr lang="en-US" dirty="0" err="1">
                 <a:cs typeface="Calibri"/>
               </a:rPr>
               <a:t>helper.extend</a:t>
             </a:r>
             <a:r>
-              <a:rPr lang="en-US">
+              <a:rPr lang="en-US" dirty="0">
                 <a:cs typeface="Calibri"/>
               </a:rPr>
               <a:t> </a:t>
@@ -4202,7 +4157,7 @@
               <a:buChar char="-"/>
             </a:pPr>
             <a:r>
-              <a:rPr lang="en-US">
+              <a:rPr lang="en-US" dirty="0">
                 <a:cs typeface="Calibri"/>
               </a:rPr>
               <a:t>lastly this Object as expression is passed as an argument</a:t>
@@ -4213,7 +4168,7 @@
               <a:buFontTx/>
               <a:buNone/>
             </a:pPr>
-            <a:endParaRPr lang="en-US">
+            <a:endParaRPr lang="en-US" dirty="0">
               <a:cs typeface="Calibri"/>
             </a:endParaRPr>
           </a:p>
@@ -4223,7 +4178,7 @@
               <a:buNone/>
             </a:pPr>
             <a:r>
-              <a:rPr lang="en-US">
+              <a:rPr lang="en-US" dirty="0">
                 <a:cs typeface="Calibri"/>
               </a:rPr>
               <a:t>3.</a:t>
@@ -4248,31 +4203,31 @@
               <a:defRPr/>
             </a:pPr>
             <a:r>
-              <a:rPr lang="en-US">
+              <a:rPr lang="en-US" dirty="0">
                 <a:cs typeface="Calibri"/>
               </a:rPr>
               <a:t>Here this </a:t>
             </a:r>
             <a:r>
-              <a:rPr lang="en-US" err="1">
+              <a:rPr lang="en-US" dirty="0" err="1">
                 <a:cs typeface="Calibri"/>
               </a:rPr>
               <a:t>destroyDatasetMeta</a:t>
             </a:r>
             <a:r>
-              <a:rPr lang="en-US">
+              <a:rPr lang="en-US" dirty="0">
                 <a:cs typeface="Calibri"/>
               </a:rPr>
               <a:t> method of this object expression is extracted which is not reported by </a:t>
             </a:r>
             <a:r>
-              <a:rPr lang="en-US" err="1">
+              <a:rPr lang="en-US" dirty="0" err="1">
                 <a:cs typeface="Calibri"/>
               </a:rPr>
               <a:t>RefDiff</a:t>
             </a:r>
             <a:r>
-              <a:rPr lang="en-US">
+              <a:rPr lang="en-US" dirty="0">
                 <a:cs typeface="Calibri"/>
               </a:rPr>
               <a:t> 2.0</a:t>
@@ -4283,7 +4238,7 @@
               <a:buFontTx/>
               <a:buNone/>
             </a:pPr>
-            <a:endParaRPr lang="en-US">
+            <a:endParaRPr lang="en-US" dirty="0">
               <a:cs typeface="Calibri"/>
             </a:endParaRPr>
           </a:p>
@@ -4370,20 +4325,20 @@
           <a:lstStyle/>
           <a:p>
             <a:r>
-              <a:rPr lang="en-US">
+              <a:rPr lang="en-US" dirty="0">
                 <a:cs typeface="Calibri"/>
               </a:rPr>
               <a:t>- Some of them have limited or partial support</a:t>
             </a:r>
           </a:p>
           <a:p>
-            <a:endParaRPr lang="en-US">
+            <a:endParaRPr lang="en-US" dirty="0">
               <a:cs typeface="Calibri"/>
             </a:endParaRPr>
           </a:p>
           <a:p>
             <a:r>
-              <a:rPr lang="en-US">
+              <a:rPr lang="en-US" dirty="0">
                 <a:cs typeface="Calibri"/>
               </a:rPr>
               <a:t>- Some of them such as default value in parameter can be used to improve accuracy in function declaration matching</a:t>
@@ -4472,39 +4427,26 @@
           <a:lstStyle/>
           <a:p>
             <a:r>
-              <a:rPr lang="en-US"/>
+              <a:rPr lang="en-US" dirty="0"/>
               <a:t>We evaluated our tool to find out answers to the 3 research questions on how it performs in detection compared to </a:t>
             </a:r>
             <a:r>
-              <a:rPr lang="en-US" err="1"/>
-              <a:t>refdiff</a:t>
-            </a:r>
-            <a:r>
-              <a:rPr lang="en-US"/>
+              <a:rPr lang="en-US" dirty="0" err="1"/>
+              <a:t>RefDiff</a:t>
+            </a:r>
+            <a:r>
+              <a:rPr lang="en-US" dirty="0"/>
               <a:t> 2.0</a:t>
             </a:r>
           </a:p>
           <a:p>
-            <a:endParaRPr lang="en-US"/>
-          </a:p>
-          <a:p>
-            <a:r>
-              <a:rPr lang="en-US"/>
-              <a:t>How it </a:t>
-            </a:r>
-            <a:r>
-              <a:rPr lang="en-US" err="1"/>
-              <a:t>peformns</a:t>
-            </a:r>
-            <a:r>
-              <a:rPr lang="en-US"/>
-              <a:t> on rename variable refactoring detection and lastly the </a:t>
-            </a:r>
-            <a:r>
-              <a:rPr lang="en-US" err="1"/>
-              <a:t>performence</a:t>
-            </a:r>
-            <a:endParaRPr lang="en-US"/>
+            <a:endParaRPr lang="en-US" dirty="0"/>
+          </a:p>
+          <a:p>
+            <a:r>
+              <a:rPr lang="en-US" dirty="0"/>
+              <a:t>How it performs on rename variable refactoring detection and lastly the performance</a:t>
+            </a:r>
           </a:p>
         </p:txBody>
       </p:sp>
@@ -4593,13 +4535,13 @@
               <a:buChar char="-"/>
             </a:pPr>
             <a:r>
-              <a:rPr lang="en-US" err="1">
+              <a:rPr lang="en-US" dirty="0" err="1">
                 <a:cs typeface="Calibri"/>
               </a:rPr>
               <a:t>RefDiff</a:t>
             </a:r>
             <a:r>
-              <a:rPr lang="en-US">
+              <a:rPr lang="en-US" dirty="0">
                 <a:cs typeface="Calibri"/>
               </a:rPr>
               <a:t> and JsDiffer commonly supports 11 types of refactorings</a:t>
@@ -4611,31 +4553,31 @@
               <a:buChar char="-"/>
             </a:pPr>
             <a:r>
-              <a:rPr lang="en-US">
+              <a:rPr lang="en-US" dirty="0">
                 <a:cs typeface="Calibri"/>
               </a:rPr>
               <a:t>We ran our tool on 608 commits from popular opensource </a:t>
             </a:r>
             <a:r>
-              <a:rPr lang="en-US" err="1">
+              <a:rPr lang="en-US" dirty="0" err="1">
                 <a:cs typeface="Calibri"/>
               </a:rPr>
               <a:t>javaScript</a:t>
             </a:r>
             <a:r>
-              <a:rPr lang="en-US">
+              <a:rPr lang="en-US" dirty="0">
                 <a:cs typeface="Calibri"/>
               </a:rPr>
               <a:t> project that were also used in the evaluation of </a:t>
             </a:r>
             <a:r>
-              <a:rPr lang="en-US" err="1">
+              <a:rPr lang="en-US" dirty="0" err="1">
                 <a:cs typeface="Calibri"/>
               </a:rPr>
               <a:t>RefDiff</a:t>
             </a:r>
             <a:r>
-              <a:rPr lang="en-US">
+              <a:rPr lang="en-US" dirty="0">
                 <a:cs typeface="Calibri"/>
               </a:rPr>
               <a:t> </a:t>
@@ -4647,14 +4589,14 @@
               <a:buChar char="-"/>
             </a:pPr>
             <a:r>
-              <a:rPr lang="en-US">
+              <a:rPr lang="en-US" dirty="0">
                 <a:cs typeface="Calibri"/>
               </a:rPr>
               <a:t>We inspected validated 279 refactoring instances and calculated their precision and recall individually </a:t>
             </a:r>
           </a:p>
           <a:p>
-            <a:endParaRPr lang="en-US">
+            <a:endParaRPr lang="en-US" dirty="0">
               <a:cs typeface="Calibri"/>
             </a:endParaRPr>
           </a:p>
@@ -4664,19 +4606,19 @@
               <a:buChar char="-"/>
             </a:pPr>
             <a:r>
-              <a:rPr lang="en-US">
+              <a:rPr lang="en-US" dirty="0">
                 <a:cs typeface="Calibri"/>
               </a:rPr>
               <a:t>Although JsDiffer achieved a slight better precision of 97% on common types it performs poorly on recall which is only 45% and </a:t>
             </a:r>
             <a:r>
-              <a:rPr lang="en-US" err="1">
+              <a:rPr lang="en-US" dirty="0" err="1">
                 <a:cs typeface="Calibri"/>
               </a:rPr>
               <a:t>RefDiff</a:t>
             </a:r>
             <a:r>
-              <a:rPr lang="en-US">
+              <a:rPr lang="en-US" dirty="0">
                 <a:cs typeface="Calibri"/>
               </a:rPr>
               <a:t> has precision and recall of 95 and 89% respectively</a:t>
@@ -4687,42 +4629,30 @@
               <a:buFontTx/>
               <a:buChar char="-"/>
             </a:pPr>
-            <a:endParaRPr lang="en-US">
+            <a:endParaRPr lang="en-US" dirty="0">
               <a:cs typeface="Calibri"/>
             </a:endParaRPr>
           </a:p>
           <a:p>
-            <a:endParaRPr lang="en-US">
+            <a:endParaRPr lang="en-US" dirty="0">
               <a:cs typeface="Calibri"/>
             </a:endParaRPr>
           </a:p>
           <a:p>
             <a:r>
-              <a:rPr lang="en-US">
-                <a:cs typeface="Calibri"/>
-              </a:rPr>
-              <a:t>1. JsDiffer reported 10 unique </a:t>
-            </a:r>
-            <a:r>
-              <a:rPr lang="en-US" err="1">
-                <a:cs typeface="Calibri"/>
-              </a:rPr>
-              <a:t>refactorigns</a:t>
-            </a:r>
-            <a:r>
-              <a:rPr lang="en-US">
-                <a:cs typeface="Calibri"/>
-              </a:rPr>
-              <a:t> not reported by </a:t>
-            </a:r>
-            <a:r>
-              <a:rPr lang="en-US" err="1">
+              <a:rPr lang="en-US" dirty="0">
+                <a:cs typeface="Calibri"/>
+              </a:rPr>
+              <a:t>1. JsDiffer reported 10 unique refactorings not reported by </a:t>
+            </a:r>
+            <a:r>
+              <a:rPr lang="en-US" dirty="0" err="1">
                 <a:cs typeface="Calibri"/>
               </a:rPr>
               <a:t>refDiff</a:t>
             </a:r>
             <a:r>
-              <a:rPr lang="en-US">
+              <a:rPr lang="en-US" dirty="0">
                 <a:cs typeface="Calibri"/>
               </a:rPr>
               <a:t> 2.0</a:t>
@@ -4733,7 +4663,7 @@
               <a:buFontTx/>
               <a:buChar char="-"/>
             </a:pPr>
-            <a:endParaRPr lang="en-US">
+            <a:endParaRPr lang="en-US" dirty="0">
               <a:cs typeface="Calibri"/>
             </a:endParaRPr>
           </a:p>
@@ -4742,7 +4672,7 @@
               <a:buFontTx/>
               <a:buChar char="-"/>
             </a:pPr>
-            <a:endParaRPr lang="en-US">
+            <a:endParaRPr lang="en-US" dirty="0">
               <a:cs typeface="Calibri"/>
             </a:endParaRPr>
           </a:p>
@@ -4751,59 +4681,59 @@
               <a:buFontTx/>
               <a:buChar char="-"/>
             </a:pPr>
-            <a:endParaRPr lang="en-US">
+            <a:endParaRPr lang="en-US" dirty="0">
               <a:cs typeface="Calibri"/>
             </a:endParaRPr>
           </a:p>
           <a:p>
             <a:r>
-              <a:rPr lang="en-US">
+              <a:rPr lang="en-US" dirty="0">
                 <a:cs typeface="Calibri"/>
               </a:rPr>
               <a:t>1. </a:t>
             </a:r>
             <a:r>
-              <a:rPr lang="en-US" err="1">
+              <a:rPr lang="en-US" dirty="0" err="1">
                 <a:cs typeface="Calibri"/>
               </a:rPr>
               <a:t>JSDiffer</a:t>
             </a:r>
             <a:r>
-              <a:rPr lang="en-US">
+              <a:rPr lang="en-US" dirty="0">
                 <a:cs typeface="Calibri"/>
               </a:rPr>
               <a:t> could not find any EXTRACT_MOVE_FUNCTION or </a:t>
             </a:r>
             <a:r>
-              <a:rPr lang="en-US" err="1">
+              <a:rPr lang="en-US" dirty="0" err="1">
                 <a:cs typeface="Calibri"/>
               </a:rPr>
               <a:t>MOVE_RENAME_FUNCTIOn</a:t>
             </a:r>
-            <a:endParaRPr lang="en-US">
+            <a:endParaRPr lang="en-US" dirty="0">
               <a:cs typeface="Calibri"/>
             </a:endParaRPr>
           </a:p>
           <a:p>
             <a:r>
-              <a:rPr lang="en-US">
+              <a:rPr lang="en-US" dirty="0">
                 <a:cs typeface="Calibri"/>
               </a:rPr>
               <a:t>2. Performed poorly on </a:t>
             </a:r>
             <a:r>
-              <a:rPr lang="en-US" err="1">
+              <a:rPr lang="en-US" dirty="0" err="1">
                 <a:cs typeface="Calibri"/>
               </a:rPr>
               <a:t>INLINE_FUNCTIOn</a:t>
             </a:r>
-            <a:endParaRPr lang="en-US">
+            <a:endParaRPr lang="en-US" dirty="0">
               <a:cs typeface="Calibri"/>
             </a:endParaRPr>
           </a:p>
           <a:p>
             <a:r>
-              <a:rPr lang="en-US">
+              <a:rPr lang="en-US" dirty="0">
                 <a:cs typeface="Calibri"/>
               </a:rPr>
               <a:t>3. Rename class is also poor with it found only 1 third of these refactoring, we inspected</a:t>
@@ -4891,20 +4821,20 @@
           <a:lstStyle/>
           <a:p>
             <a:r>
-              <a:rPr lang="en-US">
+              <a:rPr lang="en-US" dirty="0">
                 <a:cs typeface="Calibri"/>
               </a:rPr>
               <a:t>Lastly, </a:t>
             </a:r>
           </a:p>
           <a:p>
-            <a:endParaRPr lang="en-US">
+            <a:endParaRPr lang="en-US" dirty="0">
               <a:cs typeface="Calibri"/>
             </a:endParaRPr>
           </a:p>
           <a:p>
             <a:r>
-              <a:rPr lang="en-US">
+              <a:rPr lang="en-US" dirty="0">
                 <a:cs typeface="Calibri"/>
               </a:rPr>
               <a:t>We additionally validated about 80 more refactorings to calculate precision and recall all refactoring types supported by the tool </a:t>
@@ -4912,7 +4842,7 @@
           </a:p>
           <a:p>
             <a:r>
-              <a:rPr lang="en-US">
+              <a:rPr lang="en-US" dirty="0">
                 <a:cs typeface="Calibri"/>
               </a:rPr>
               <a:t>. We created an oracle of 341 validated refactorings</a:t>
@@ -4924,19 +4854,19 @@
               <a:buChar char="-"/>
             </a:pPr>
             <a:r>
-              <a:rPr lang="en-US">
+              <a:rPr lang="en-US" dirty="0">
                 <a:cs typeface="Calibri"/>
               </a:rPr>
               <a:t>As you can see JsDiffer performed better in Precision here as well however, it has only half of the recall of </a:t>
             </a:r>
             <a:r>
-              <a:rPr lang="en-US" err="1">
+              <a:rPr lang="en-US" dirty="0" err="1">
                 <a:cs typeface="Calibri"/>
               </a:rPr>
               <a:t>RefDiff</a:t>
             </a:r>
             <a:r>
-              <a:rPr lang="en-US">
+              <a:rPr lang="en-US" dirty="0">
                 <a:cs typeface="Calibri"/>
               </a:rPr>
               <a:t> 2.0 </a:t>
@@ -4948,13 +4878,13 @@
               <a:buChar char="-"/>
             </a:pPr>
             <a:r>
-              <a:rPr lang="en-US" err="1">
+              <a:rPr lang="en-US" dirty="0" err="1">
                 <a:cs typeface="Calibri"/>
               </a:rPr>
               <a:t>RefDiff’s</a:t>
             </a:r>
             <a:r>
-              <a:rPr lang="en-US">
+              <a:rPr lang="en-US" dirty="0">
                 <a:cs typeface="Calibri"/>
               </a:rPr>
               <a:t> precision also dropped here but the recall improved slightly</a:t>
@@ -4965,7 +4895,7 @@
               <a:buFontTx/>
               <a:buChar char="-"/>
             </a:pPr>
-            <a:endParaRPr lang="en-US">
+            <a:endParaRPr lang="en-US" dirty="0">
               <a:cs typeface="Calibri"/>
             </a:endParaRPr>
           </a:p>
@@ -4975,10 +4905,10 @@
               <a:buNone/>
             </a:pPr>
             <a:r>
-              <a:rPr lang="en-US">
-                <a:cs typeface="Calibri"/>
-              </a:rPr>
-              <a:t>Before ending this slide We would like to add that </a:t>
+              <a:rPr lang="en-US" dirty="0">
+                <a:cs typeface="Calibri"/>
+              </a:rPr>
+              <a:t>Before ending this slide, We would like to add that </a:t>
             </a:r>
           </a:p>
           <a:p>
@@ -5000,11 +4930,11 @@
               <a:defRPr/>
             </a:pPr>
             <a:r>
-              <a:rPr lang="en-US"/>
+              <a:rPr lang="en-US" dirty="0"/>
               <a:t> P</a:t>
             </a:r>
             <a:r>
-              <a:rPr lang="en-US" sz="1200">
+              <a:rPr lang="en-US" sz="1200" dirty="0">
                 <a:ea typeface="+mn-lt"/>
                 <a:cs typeface="+mn-lt"/>
               </a:rPr>
@@ -5012,11 +4942,11 @@
             </a:r>
           </a:p>
           <a:p>
-            <a:endParaRPr lang="en-US"/>
-          </a:p>
-          <a:p>
-            <a:r>
-              <a:rPr lang="en-US"/>
+            <a:endParaRPr lang="en-US" dirty="0"/>
+          </a:p>
+          <a:p>
+            <a:r>
+              <a:rPr lang="en-US" dirty="0"/>
               <a:t>1</a:t>
             </a:r>
           </a:p>
@@ -5200,16 +5130,10 @@
           <a:lstStyle/>
           <a:p>
             <a:r>
-              <a:rPr lang="en-US">
-                <a:cs typeface="Calibri"/>
-              </a:rPr>
-              <a:t>We validated only rename variable as it's one of the most popular </a:t>
-            </a:r>
-            <a:r>
-              <a:rPr lang="en-US" err="1">
-                <a:cs typeface="Calibri"/>
-              </a:rPr>
-              <a:t>refactorings</a:t>
+              <a:rPr lang="en-US" dirty="0">
+                <a:cs typeface="Calibri"/>
+              </a:rPr>
+              <a:t>We validated only rename variable as it's one of the most popular refactorings</a:t>
             </a:r>
           </a:p>
         </p:txBody>
@@ -5400,36 +5324,28 @@
           <a:lstStyle/>
           <a:p>
             <a:r>
-              <a:rPr lang="en-US"/>
+              <a:rPr lang="en-US" dirty="0"/>
               <a:t>Now we are going to discuss the reasons behind poor recall of JsDiffer</a:t>
             </a:r>
           </a:p>
           <a:p>
-            <a:endParaRPr lang="en-US"/>
-          </a:p>
-          <a:p>
-            <a:r>
-              <a:rPr lang="en-US"/>
-              <a:t>We inspected a random sample  of 37 </a:t>
-            </a:r>
-            <a:r>
-              <a:rPr lang="en-US" err="1"/>
-              <a:t>refactornings</a:t>
-            </a:r>
-            <a:r>
-              <a:rPr lang="en-US"/>
-              <a:t> instances which our tool did not report and this pie chart shows the reason. I will focus on the major ones.</a:t>
-            </a:r>
-          </a:p>
-          <a:p>
-            <a:endParaRPr lang="en-US"/>
+            <a:endParaRPr lang="en-US" dirty="0"/>
+          </a:p>
+          <a:p>
+            <a:r>
+              <a:rPr lang="en-US" dirty="0"/>
+              <a:t>We inspected a random sample  of 37 refactorings instances which our tool did not report and this pie chart shows the reason. I will focus on the major ones.</a:t>
+            </a:r>
+          </a:p>
+          <a:p>
+            <a:endParaRPr lang="en-US" dirty="0"/>
           </a:p>
           <a:p>
             <a:pPr marL="228600" indent="-228600">
               <a:buAutoNum type="arabicPeriod"/>
             </a:pPr>
             <a:r>
-              <a:rPr lang="en-US"/>
+              <a:rPr lang="en-US" dirty="0"/>
               <a:t>The single most major reason of 19% missed refactoring is the subexpression matching.</a:t>
             </a:r>
           </a:p>
@@ -5437,7 +5353,7 @@
             <a:pPr marL="228600" indent="-228600">
               <a:buAutoNum type="arabicPeriod"/>
             </a:pPr>
-            <a:endParaRPr lang="en-US"/>
+            <a:endParaRPr lang="en-US" dirty="0"/>
           </a:p>
           <a:p>
             <a:pPr marL="0" marR="0" lvl="0" indent="0" algn="l" defTabSz="914400" rtl="0" eaLnBrk="1" fontAlgn="auto" latinLnBrk="0" hangingPunct="1">
@@ -5458,7 +5374,7 @@
               <a:defRPr/>
             </a:pPr>
             <a:r>
-              <a:rPr lang="en-US"/>
+              <a:rPr lang="en-US" dirty="0"/>
               <a:t>JavaScript programs written in a Functional way which involves using function as a variable. Therefore, a single or leaf statement or expression often contains multiple function declarations. By RefactoringMiner approach it becomes a  huge leaf statement and sometimes the whole program is only a leaf statement. Since our approach cannot go lower than statement level, it has very limited support on matching subexpressions.</a:t>
             </a:r>
           </a:p>
@@ -5466,10 +5382,10 @@
             <a:pPr marL="228600" indent="-228600">
               <a:buAutoNum type="arabicPeriod"/>
             </a:pPr>
-            <a:endParaRPr lang="en-US"/>
-          </a:p>
-          <a:p>
-            <a:endParaRPr lang="en-US"/>
+            <a:endParaRPr lang="en-US" dirty="0"/>
+          </a:p>
+          <a:p>
+            <a:endParaRPr lang="en-US" dirty="0"/>
           </a:p>
           <a:p>
             <a:pPr marL="0" marR="0" lvl="0" indent="0" algn="l" defTabSz="914400" rtl="0" eaLnBrk="1" fontAlgn="auto" latinLnBrk="0" hangingPunct="1">
@@ -5490,39 +5406,27 @@
               <a:defRPr/>
             </a:pPr>
             <a:r>
-              <a:rPr lang="en-US"/>
+              <a:rPr lang="en-US" dirty="0"/>
               <a:t>2. . Functions can be declared anywhere in </a:t>
             </a:r>
             <a:r>
-              <a:rPr lang="en-US" err="1"/>
+              <a:rPr lang="en-US" dirty="0" err="1"/>
               <a:t>JavaSCript</a:t>
             </a:r>
             <a:r>
-              <a:rPr lang="en-US"/>
-              <a:t>, If we </a:t>
-            </a:r>
-            <a:r>
-              <a:rPr lang="en-US" err="1"/>
-              <a:t>generalzie</a:t>
-            </a:r>
-            <a:r>
-              <a:rPr lang="en-US"/>
-              <a:t> all of these moving outside of parent container category, they make up about 37.84% combined </a:t>
-            </a:r>
-          </a:p>
-          <a:p>
-            <a:endParaRPr lang="en-US"/>
-          </a:p>
-          <a:p>
-            <a:r>
-              <a:rPr lang="en-US" err="1"/>
-              <a:t>RefactoringmIner</a:t>
-            </a:r>
-            <a:r>
-              <a:rPr lang="en-US"/>
-              <a:t> assumes that Functions can only be declared directly inside a class therefore this moving outside of parent container is not supported by RefactoringMiner</a:t>
-            </a:r>
-            <a:endParaRPr lang="en-US">
+              <a:rPr lang="en-US" dirty="0"/>
+              <a:t>, If we generalize all of these moving outside of parent container category, they make up about 37.84% combined </a:t>
+            </a:r>
+          </a:p>
+          <a:p>
+            <a:endParaRPr lang="en-US" dirty="0"/>
+          </a:p>
+          <a:p>
+            <a:r>
+              <a:rPr lang="en-US" dirty="0"/>
+              <a:t>RefactoringMiner assumes that Functions can only be declared directly inside a class therefore this moving outside of parent container is not supported by RefactoringMiner</a:t>
+            </a:r>
+            <a:endParaRPr lang="en-US" dirty="0">
               <a:cs typeface="Calibri"/>
             </a:endParaRPr>
           </a:p>
@@ -5609,127 +5513,119 @@
           <a:lstStyle/>
           <a:p>
             <a:r>
-              <a:rPr lang="en-US"/>
+              <a:rPr lang="en-US" dirty="0"/>
               <a:t>Now I am going to discuss some of the limitations</a:t>
             </a:r>
           </a:p>
           <a:p>
             <a:r>
-              <a:rPr lang="en-US"/>
+              <a:rPr lang="en-US" dirty="0"/>
               <a:t>-Cannot match invocation with declaration when the Function is extracted outside of the immediate parent container scope</a:t>
             </a:r>
-            <a:endParaRPr lang="en-US">
+            <a:endParaRPr lang="en-US" dirty="0">
               <a:cs typeface="Calibri"/>
             </a:endParaRPr>
           </a:p>
           <a:p>
             <a:r>
-              <a:rPr lang="en-US"/>
+              <a:rPr lang="en-US" dirty="0"/>
               <a:t>Does not process Super sets (e.g. TypeScript)</a:t>
             </a:r>
-            <a:endParaRPr lang="en-US">
+            <a:endParaRPr lang="en-US" dirty="0">
               <a:cs typeface="Calibri"/>
             </a:endParaRPr>
           </a:p>
           <a:p>
             <a:r>
-              <a:rPr lang="en-US"/>
+              <a:rPr lang="en-US" dirty="0"/>
               <a:t>Does not go inside class expressions at this moment</a:t>
             </a:r>
-            <a:endParaRPr lang="en-US">
+            <a:endParaRPr lang="en-US" dirty="0">
               <a:cs typeface="Calibri"/>
             </a:endParaRPr>
           </a:p>
           <a:p>
             <a:r>
-              <a:rPr lang="en-US"/>
+              <a:rPr lang="en-US" dirty="0"/>
               <a:t> </a:t>
             </a:r>
-            <a:endParaRPr lang="en-US">
+            <a:endParaRPr lang="en-US" dirty="0">
               <a:cs typeface="Calibri"/>
             </a:endParaRPr>
           </a:p>
           <a:p>
             <a:r>
-              <a:rPr lang="en-US"/>
+              <a:rPr lang="en-US" dirty="0"/>
               <a:t>Unique JavaScript features are not supported (default values of parameters, </a:t>
             </a:r>
             <a:r>
-              <a:rPr lang="en-US" err="1"/>
+              <a:rPr lang="en-US" dirty="0" err="1"/>
               <a:t>Destructuring</a:t>
             </a:r>
             <a:r>
-              <a:rPr lang="en-US"/>
+              <a:rPr lang="en-US" dirty="0"/>
               <a:t> Assignment etc.)</a:t>
             </a:r>
-            <a:endParaRPr lang="en-US">
+            <a:endParaRPr lang="en-US" dirty="0">
               <a:cs typeface="Calibri"/>
             </a:endParaRPr>
           </a:p>
           <a:p>
             <a:r>
-              <a:rPr lang="en-US"/>
+              <a:rPr lang="en-US" dirty="0"/>
               <a:t> </a:t>
             </a:r>
-            <a:endParaRPr lang="en-US">
+            <a:endParaRPr lang="en-US" dirty="0">
               <a:cs typeface="Calibri"/>
             </a:endParaRPr>
           </a:p>
           <a:p>
             <a:r>
-              <a:rPr lang="en-US"/>
+              <a:rPr lang="en-US" dirty="0"/>
               <a:t> </a:t>
             </a:r>
-            <a:endParaRPr lang="en-US">
+            <a:endParaRPr lang="en-US" dirty="0">
               <a:cs typeface="Calibri"/>
             </a:endParaRPr>
           </a:p>
           <a:p>
             <a:r>
-              <a:rPr lang="en-US"/>
-              <a:t>This is because </a:t>
-            </a:r>
-            <a:r>
-              <a:rPr lang="en-US" err="1"/>
-              <a:t>RefactoringMiner</a:t>
-            </a:r>
-            <a:r>
-              <a:rPr lang="en-US"/>
-              <a:t> assumes function can only be declared in a Class, Therefore in Java we have some hints where to look for the function. Here it can be anywhere in the nesting depths or another file.</a:t>
-            </a:r>
-            <a:endParaRPr lang="en-US">
+              <a:rPr lang="en-US" dirty="0"/>
+              <a:t>This is because RefactoringMiner assumes function can only be declared in a Class, Therefore in Java we have some hints where to look for the function. Here it can be anywhere in the nesting depths or another file.</a:t>
+            </a:r>
+            <a:endParaRPr lang="en-US" dirty="0">
               <a:cs typeface="Calibri"/>
             </a:endParaRPr>
           </a:p>
           <a:p>
             <a:r>
-              <a:rPr lang="en-US"/>
+              <a:rPr lang="en-US" dirty="0"/>
               <a:t>While statements are java are small things, and have smaller nesting depth and complexity, the usage of function in creating scope and usage in variable increased the complexity</a:t>
             </a:r>
-            <a:endParaRPr lang="en-US">
+            <a:endParaRPr lang="en-US" dirty="0">
               <a:cs typeface="Calibri"/>
             </a:endParaRPr>
           </a:p>
           <a:p>
             <a:r>
-              <a:rPr lang="en-US"/>
+              <a:rPr lang="en-US" dirty="0"/>
               <a:t>Class expressions were not prevalent on the commits that we analyzed</a:t>
             </a:r>
-            <a:endParaRPr lang="en-US">
+            <a:endParaRPr lang="en-US" dirty="0">
               <a:cs typeface="Calibri"/>
             </a:endParaRPr>
           </a:p>
           <a:p>
             <a:r>
-              <a:rPr lang="en-US"/>
+              <a:rPr lang="en-US" dirty="0"/>
               <a:t> </a:t>
             </a:r>
-            <a:endParaRPr lang="en-US">
+            <a:endParaRPr lang="en-US" dirty="0">
               <a:cs typeface="Calibri"/>
             </a:endParaRPr>
           </a:p>
           <a:p>
-            <a:endParaRPr lang="en-US">
+            <a:endParaRPr lang="en-US" dirty="0">
               <a:cs typeface="Calibri"/>
             </a:endParaRPr>
           </a:p>
@@ -5816,88 +5712,80 @@
           <a:lstStyle/>
           <a:p>
             <a:r>
-              <a:rPr lang="en-US"/>
+              <a:rPr lang="en-US" dirty="0"/>
               <a:t>1. oracle is manually labeled, and human errors might exist</a:t>
             </a:r>
           </a:p>
           <a:p>
             <a:r>
-              <a:rPr lang="en-US"/>
+              <a:rPr lang="en-US" dirty="0"/>
               <a:t>during validation</a:t>
             </a:r>
-            <a:endParaRPr lang="en-US">
+            <a:endParaRPr lang="en-US" dirty="0">
               <a:cs typeface="Calibri"/>
             </a:endParaRPr>
           </a:p>
           <a:p>
             <a:r>
-              <a:rPr lang="en-US"/>
+              <a:rPr lang="en-US" dirty="0"/>
               <a:t>To mitigate this threat, we have more than</a:t>
             </a:r>
-            <a:endParaRPr lang="en-US">
+            <a:endParaRPr lang="en-US" dirty="0">
               <a:cs typeface="Calibri"/>
             </a:endParaRPr>
           </a:p>
           <a:p>
             <a:r>
-              <a:rPr lang="en-US"/>
+              <a:rPr lang="en-US" dirty="0"/>
               <a:t>one person to inspect cases in doubt.</a:t>
             </a:r>
-            <a:endParaRPr lang="en-US">
+            <a:endParaRPr lang="en-US" dirty="0">
               <a:cs typeface="Calibri"/>
             </a:endParaRPr>
           </a:p>
           <a:p>
             <a:r>
-              <a:rPr lang="en-US"/>
+              <a:rPr lang="en-US" dirty="0"/>
               <a:t>2. For example we have only one </a:t>
             </a:r>
             <a:r>
-              <a:rPr lang="en-US" err="1"/>
+              <a:rPr lang="en-US" dirty="0" err="1"/>
               <a:t>MoveClass</a:t>
             </a:r>
             <a:r>
-              <a:rPr lang="en-US"/>
+              <a:rPr lang="en-US" dirty="0"/>
               <a:t> refactoring instance </a:t>
             </a:r>
-            <a:endParaRPr lang="en-US">
+            <a:endParaRPr lang="en-US" dirty="0">
               <a:cs typeface="Calibri"/>
             </a:endParaRPr>
           </a:p>
           <a:p>
             <a:r>
-              <a:rPr lang="en-US"/>
+              <a:rPr lang="en-US" dirty="0"/>
               <a:t>Lastly, both tool can miss refactoring making it harder to calculate recall</a:t>
             </a:r>
           </a:p>
           <a:p>
             <a:r>
-              <a:rPr lang="en-US"/>
+              <a:rPr lang="en-US" dirty="0"/>
               <a:t>•</a:t>
             </a:r>
-            <a:endParaRPr lang="en-US">
+            <a:endParaRPr lang="en-US" dirty="0">
               <a:cs typeface="Calibri"/>
             </a:endParaRPr>
           </a:p>
           <a:p>
             <a:r>
-              <a:rPr lang="en-US"/>
-              <a:t>•Heavily Inspired by </a:t>
-            </a:r>
-            <a:r>
-              <a:rPr lang="en-US" err="1"/>
-              <a:t>RefactoringMiner’s</a:t>
-            </a:r>
-            <a:r>
-              <a:rPr lang="en-US"/>
-              <a:t> structural matching approach</a:t>
-            </a:r>
-            <a:endParaRPr lang="en-US">
+              <a:rPr lang="en-US" dirty="0"/>
+              <a:t>•Heavily Inspired by RefactoringMiner’s structural matching approach</a:t>
+            </a:r>
+            <a:endParaRPr lang="en-US" dirty="0">
               <a:cs typeface="Calibri"/>
             </a:endParaRPr>
           </a:p>
           <a:p>
-            <a:endParaRPr lang="en-US">
+            <a:endParaRPr lang="en-US" dirty="0">
               <a:cs typeface="Calibri"/>
             </a:endParaRPr>
           </a:p>
@@ -5988,84 +5876,60 @@
               <a:buChar char="•"/>
             </a:pPr>
             <a:r>
-              <a:rPr lang="en-US" b="1"/>
+              <a:rPr lang="en-US" b="1" dirty="0"/>
               <a:t>1. Finally,</a:t>
             </a:r>
             <a:r>
-              <a:rPr lang="en-US"/>
+              <a:rPr lang="en-US" dirty="0"/>
               <a:t> Based on our experiments, we recommend that JavaScript projects may need a hybrid</a:t>
             </a:r>
             <a:br>
-              <a:rPr lang="en-US">
+              <a:rPr lang="en-US" dirty="0">
                 <a:cs typeface="+mn-lt"/>
               </a:rPr>
             </a:br>
             <a:r>
-              <a:rPr lang="en-US"/>
+              <a:rPr lang="en-US" dirty="0"/>
               <a:t> approach that combines both </a:t>
             </a:r>
             <a:r>
-              <a:rPr lang="en-US" err="1"/>
+              <a:rPr lang="en-US" dirty="0" err="1"/>
               <a:t>RefDiff</a:t>
             </a:r>
             <a:r>
-              <a:rPr lang="en-US"/>
-              <a:t> and </a:t>
-            </a:r>
-            <a:r>
-              <a:rPr lang="en-US" err="1"/>
-              <a:t>RefactoringMiner</a:t>
-            </a:r>
-            <a:r>
-              <a:rPr lang="en-US"/>
-              <a:t> approaches, where at first,</a:t>
+              <a:rPr lang="en-US" dirty="0"/>
+              <a:t> and RefactoringMiner approaches, where at first,</a:t>
             </a:r>
             <a:br>
-              <a:rPr lang="en-US">
+              <a:rPr lang="en-US" dirty="0">
                 <a:cs typeface="+mn-lt"/>
               </a:rPr>
             </a:br>
             <a:r>
-              <a:rPr lang="en-US"/>
+              <a:rPr lang="en-US" dirty="0"/>
               <a:t> high-level program elements (functions, classes, files) are matched following </a:t>
             </a:r>
             <a:r>
-              <a:rPr lang="en-US" err="1"/>
+              <a:rPr lang="en-US" dirty="0" err="1"/>
               <a:t>RefDiff’s</a:t>
             </a:r>
             <a:br>
-              <a:rPr lang="en-US">
+              <a:rPr lang="en-US" dirty="0">
                 <a:cs typeface="+mn-lt"/>
               </a:rPr>
             </a:br>
             <a:r>
-              <a:rPr lang="en-US"/>
-              <a:t> approach, and then </a:t>
-            </a:r>
-            <a:r>
-              <a:rPr lang="en-US" err="1"/>
-              <a:t>RefactoringMiner’s</a:t>
-            </a:r>
-            <a:r>
-              <a:rPr lang="en-US"/>
-              <a:t> statement mapping approach is applied to detect</a:t>
+              <a:rPr lang="en-US" dirty="0"/>
+              <a:t> approach, and then RefactoringMiner’s statement mapping approach is applied to detect</a:t>
             </a:r>
             <a:br>
-              <a:rPr lang="en-US">
+              <a:rPr lang="en-US" dirty="0">
                 <a:cs typeface="+mn-lt"/>
               </a:rPr>
             </a:br>
             <a:r>
-              <a:rPr lang="en-US"/>
-              <a:t> low-level </a:t>
-            </a:r>
-            <a:r>
-              <a:rPr lang="en-US" err="1"/>
-              <a:t>refactorings</a:t>
-            </a:r>
-            <a:r>
-              <a:rPr lang="en-US"/>
-              <a:t>.</a:t>
+              <a:rPr lang="en-US" dirty="0"/>
+              <a:t> low-level refactorings.</a:t>
             </a:r>
           </a:p>
           <a:p>
@@ -6075,10 +5939,10 @@
               <a:defRPr/>
             </a:pPr>
             <a:r>
-              <a:rPr lang="en-US"/>
+              <a:rPr lang="en-US" dirty="0"/>
               <a:t>●</a:t>
             </a:r>
-            <a:endParaRPr lang="en-US">
+            <a:endParaRPr lang="en-US" dirty="0">
               <a:cs typeface="Calibri"/>
             </a:endParaRPr>
           </a:p>
@@ -6088,7 +5952,7 @@
               <a:buChar char="•"/>
               <a:defRPr/>
             </a:pPr>
-            <a:endParaRPr lang="en-US">
+            <a:endParaRPr lang="en-US" dirty="0">
               <a:cs typeface="Calibri"/>
             </a:endParaRPr>
           </a:p>
@@ -6109,67 +5973,24 @@
               <a:defRPr/>
             </a:pPr>
             <a:r>
-              <a:rPr lang="en-US"/>
+              <a:rPr lang="en-US" dirty="0"/>
               <a:t>2.</a:t>
             </a:r>
             <a:r>
-              <a:rPr lang="en-US" b="1"/>
+              <a:rPr lang="en-US" b="1" dirty="0"/>
               <a:t>Lesson learned: </a:t>
             </a:r>
             <a:r>
-              <a:rPr lang="en-US"/>
-              <a:t>We can also target other languages that are written Like  Java for example C# With the hybrid approach. </a:t>
-            </a:r>
-            <a:r>
-              <a:rPr lang="en-US" err="1"/>
-              <a:t>R</a:t>
-            </a:r>
-            <a:r>
-              <a:rPr lang="en-US" b="0" i="0" err="1">
+              <a:rPr lang="en-US" dirty="0"/>
+              <a:t>We can also target other languages that are written Like  Java for example C# With the hybrid approach. R</a:t>
+            </a:r>
+            <a:r>
+              <a:rPr lang="en-US" b="0" i="0" dirty="0">
                 <a:effectLst/>
               </a:rPr>
-              <a:t>efactoringMiner</a:t>
-            </a:r>
-            <a:r>
-              <a:rPr lang="en-US" b="0" i="0">
-                <a:effectLst/>
-              </a:rPr>
-              <a:t> was designed </a:t>
-            </a:r>
-            <a:r>
-              <a:rPr lang="en-US" b="0" i="0" err="1">
-                <a:effectLst/>
-              </a:rPr>
-              <a:t>hav</a:t>
-            </a:r>
-            <a:r>
-              <a:rPr lang="en-US" b="0" i="0">
-                <a:effectLst/>
-              </a:rPr>
-              <a:t>-</a:t>
-            </a:r>
-            <a:br>
-              <a:rPr lang="en-US">
-                <a:cs typeface="+mn-lt"/>
-              </a:rPr>
-            </a:br>
-            <a:r>
-              <a:rPr lang="en-US"/>
-              <a:t> </a:t>
-            </a:r>
-            <a:r>
-              <a:rPr lang="en-US" b="0" i="0" err="1">
-                <a:effectLst/>
-              </a:rPr>
-              <a:t>ing</a:t>
-            </a:r>
-            <a:r>
-              <a:rPr lang="en-US" b="0" i="0">
-                <a:effectLst/>
-              </a:rPr>
-              <a:t> the typical Java program structure in mind therefore it is expected to perform better on programs written in similar fashion of Java</a:t>
-            </a:r>
-            <a:endParaRPr lang="en-US">
+              <a:t>efactoringMiner was designed having the typical Java program structure in mind therefore it is expected to perform better on programs written in similar fashion of Java</a:t>
+            </a:r>
+            <a:endParaRPr lang="en-US" dirty="0">
               <a:cs typeface="Calibri" panose="020F0502020204030204"/>
             </a:endParaRPr>
           </a:p>
@@ -6177,7 +5998,7 @@
             <a:pPr>
               <a:defRPr/>
             </a:pPr>
-            <a:endParaRPr lang="en-US">
+            <a:endParaRPr lang="en-US" dirty="0">
               <a:cs typeface="Calibri" panose="020F0502020204030204"/>
             </a:endParaRPr>
           </a:p>
@@ -6198,7 +6019,7 @@
               <a:tabLst/>
               <a:defRPr/>
             </a:pPr>
-            <a:endParaRPr lang="en-US">
+            <a:endParaRPr lang="en-US" dirty="0">
               <a:cs typeface="Calibri" panose="020F0502020204030204"/>
             </a:endParaRPr>
           </a:p>
@@ -6658,7 +6479,7 @@
           <a:lstStyle/>
           <a:p>
             <a:r>
-              <a:rPr lang="en-US">
+              <a:rPr lang="en-US" dirty="0">
                 <a:cs typeface="Calibri"/>
               </a:rPr>
               <a:t>- Now I will briefly discuss 3 state of the art detection tools</a:t>
@@ -6666,27 +6487,15 @@
           </a:p>
           <a:p>
             <a:r>
-              <a:rPr lang="en-US">
-                <a:cs typeface="Calibri"/>
-              </a:rPr>
-              <a:t>- First is Refactoring miner 2.0 which is the only tool capable of detecting </a:t>
-            </a:r>
-            <a:r>
-              <a:rPr lang="en-US" err="1">
-                <a:cs typeface="Calibri"/>
-              </a:rPr>
-              <a:t>refactorings</a:t>
-            </a:r>
-            <a:r>
-              <a:rPr lang="en-US">
-                <a:cs typeface="Calibri"/>
-              </a:rPr>
-              <a:t> on variable or statement level. For example, rename variable.</a:t>
-            </a:r>
-          </a:p>
-          <a:p>
-            <a:r>
-              <a:rPr lang="en-US">
+              <a:rPr lang="en-US" dirty="0">
+                <a:cs typeface="Calibri"/>
+              </a:rPr>
+              <a:t>- First is Refactoring miner 2.0 which is the only tool capable of detecting refactorings on variable or statement level. For example, rename variable.</a:t>
+            </a:r>
+          </a:p>
+          <a:p>
+            <a:r>
+              <a:rPr lang="en-US" dirty="0">
                 <a:cs typeface="Calibri"/>
               </a:rPr>
               <a:t>- It also has the highest precision close to 100% and at the same time very good recall of 94%</a:t>
@@ -6694,44 +6503,44 @@
           </a:p>
           <a:p>
             <a:r>
-              <a:rPr lang="en-US">
+              <a:rPr lang="en-US" dirty="0">
                 <a:cs typeface="Calibri"/>
               </a:rPr>
               <a:t>- It structurally matches elements in statement level and can match code that are </a:t>
             </a:r>
             <a:r>
-              <a:rPr lang="en-US" err="1">
+              <a:rPr lang="en-US" dirty="0" err="1">
                 <a:cs typeface="Calibri"/>
               </a:rPr>
               <a:t>signicantly</a:t>
             </a:r>
             <a:r>
-              <a:rPr lang="en-US">
+              <a:rPr lang="en-US" dirty="0">
                 <a:cs typeface="Calibri"/>
               </a:rPr>
               <a:t> textually different</a:t>
             </a:r>
           </a:p>
           <a:p>
-            <a:endParaRPr lang="en-US">
+            <a:endParaRPr lang="en-US" dirty="0">
               <a:cs typeface="Calibri"/>
             </a:endParaRPr>
           </a:p>
           <a:p>
             <a:r>
-              <a:rPr lang="en-US">
+              <a:rPr lang="en-US" dirty="0">
                 <a:cs typeface="Calibri"/>
               </a:rPr>
               <a:t>- Next we have </a:t>
             </a:r>
             <a:r>
-              <a:rPr lang="en-US" err="1">
+              <a:rPr lang="en-US" dirty="0" err="1">
                 <a:cs typeface="Calibri"/>
               </a:rPr>
               <a:t>refDiff</a:t>
             </a:r>
             <a:r>
-              <a:rPr lang="en-US">
+              <a:rPr lang="en-US" dirty="0">
                 <a:cs typeface="Calibri"/>
               </a:rPr>
               <a:t> 2.0 which measures the similarity of tokens inside container elements</a:t>
@@ -6739,7 +6548,7 @@
           </a:p>
           <a:p>
             <a:r>
-              <a:rPr lang="en-US">
+              <a:rPr lang="en-US" dirty="0">
                 <a:cs typeface="Calibri"/>
               </a:rPr>
               <a:t>- It is the first multi language tool and supports java C and only tool that supports JavaScript</a:t>
@@ -6747,32 +6556,32 @@
           </a:p>
           <a:p>
             <a:r>
-              <a:rPr lang="en-US">
+              <a:rPr lang="en-US" dirty="0">
                 <a:cs typeface="Calibri"/>
               </a:rPr>
               <a:t>- It has a precision and recall of around 90%</a:t>
             </a:r>
           </a:p>
           <a:p>
-            <a:endParaRPr lang="en-US">
+            <a:endParaRPr lang="en-US" dirty="0">
               <a:cs typeface="Calibri"/>
             </a:endParaRPr>
           </a:p>
           <a:p>
             <a:r>
-              <a:rPr lang="en-US">
+              <a:rPr lang="en-US" dirty="0">
                 <a:cs typeface="Calibri"/>
               </a:rPr>
               <a:t>- The last and newest of them is </a:t>
             </a:r>
             <a:r>
-              <a:rPr lang="en-US" err="1">
+              <a:rPr lang="en-US" dirty="0" err="1">
                 <a:cs typeface="Calibri"/>
               </a:rPr>
               <a:t>RefDetect</a:t>
             </a:r>
             <a:r>
-              <a:rPr lang="en-US">
+              <a:rPr lang="en-US" dirty="0">
                 <a:cs typeface="Calibri"/>
               </a:rPr>
               <a:t>.</a:t>
@@ -6780,7 +6589,7 @@
           </a:p>
           <a:p>
             <a:r>
-              <a:rPr lang="en-US">
+              <a:rPr lang="en-US" dirty="0">
                 <a:cs typeface="Calibri"/>
               </a:rPr>
               <a:t>- It represents programs as a sequence of characters and detection is done by String Alignment Algorithm named FOGSSA</a:t>
@@ -6788,44 +6597,32 @@
           </a:p>
           <a:p>
             <a:r>
-              <a:rPr lang="en-US">
+              <a:rPr lang="en-US" dirty="0">
                 <a:cs typeface="Calibri"/>
               </a:rPr>
               <a:t>- IT supports Java and C++</a:t>
             </a:r>
           </a:p>
           <a:p>
-            <a:endParaRPr lang="en-US">
+            <a:endParaRPr lang="en-US" dirty="0">
               <a:cs typeface="Calibri"/>
             </a:endParaRPr>
           </a:p>
           <a:p>
             <a:r>
-              <a:rPr lang="en-US">
-                <a:cs typeface="Calibri"/>
-              </a:rPr>
-              <a:t>Since </a:t>
-            </a:r>
-            <a:r>
-              <a:rPr lang="en-US" err="1">
-                <a:cs typeface="Calibri"/>
-              </a:rPr>
-              <a:t>RefactoringMiner</a:t>
-            </a:r>
-            <a:r>
-              <a:rPr lang="en-US">
-                <a:cs typeface="Calibri"/>
-              </a:rPr>
-              <a:t> does not support JS, but it's the current state of the art detection tool therefore our goal is to take </a:t>
-            </a:r>
-            <a:r>
-              <a:rPr lang="en-US" err="1">
+              <a:rPr lang="en-US" dirty="0">
+                <a:cs typeface="Calibri"/>
+              </a:rPr>
+              <a:t>Since RefactoringMiner does not support JS, but it's the current state of the art detection tool therefore our goal is to take </a:t>
+            </a:r>
+            <a:r>
+              <a:rPr lang="en-US" dirty="0" err="1">
                 <a:cs typeface="Calibri"/>
               </a:rPr>
               <a:t>inspirion</a:t>
             </a:r>
             <a:r>
-              <a:rPr lang="en-US">
+              <a:rPr lang="en-US" dirty="0">
                 <a:cs typeface="Calibri"/>
               </a:rPr>
               <a:t> from this tool and apply it in JavaScript</a:t>
@@ -6913,95 +6710,86 @@
           <a:bodyPr/>
           <a:lstStyle/>
           <a:p>
-            <a:endParaRPr lang="en-US"/>
-          </a:p>
-          <a:p>
-            <a:r>
-              <a:rPr lang="en-US">
+            <a:endParaRPr lang="en-US" dirty="0"/>
+          </a:p>
+          <a:p>
+            <a:r>
+              <a:rPr lang="en-US" dirty="0">
                 <a:cs typeface="Calibri"/>
               </a:rPr>
               <a:t>Now I am going to discuss some of the limitations of existing approaches</a:t>
             </a:r>
           </a:p>
           <a:p>
-            <a:endParaRPr lang="en-US">
+            <a:endParaRPr lang="en-US" dirty="0">
               <a:cs typeface="Calibri"/>
             </a:endParaRPr>
           </a:p>
           <a:p>
             <a:r>
-              <a:rPr lang="en-US">
-                <a:cs typeface="Calibri"/>
-              </a:rPr>
-              <a:t>- Almost all the existing tools are </a:t>
-            </a:r>
-            <a:r>
-              <a:rPr lang="en-US" err="1">
-                <a:cs typeface="Calibri"/>
-              </a:rPr>
-              <a:t>JavaBased</a:t>
-            </a:r>
-            <a:endParaRPr lang="en-US">
+              <a:rPr lang="en-US" dirty="0">
+                <a:cs typeface="Calibri"/>
+              </a:rPr>
+              <a:t>- Almost all the existing tools are Java Based</a:t>
+            </a:r>
+          </a:p>
+          <a:p>
+            <a:r>
+              <a:rPr lang="en-US" dirty="0">
+                <a:cs typeface="Calibri"/>
+              </a:rPr>
+              <a:t>- Cannot detecting refactorings lower than container level</a:t>
+            </a:r>
+            <a:endParaRPr lang="en-US" dirty="0"/>
+          </a:p>
+          <a:p>
+            <a:r>
+              <a:rPr lang="en-US" dirty="0">
+                <a:cs typeface="Calibri"/>
+              </a:rPr>
+              <a:t>- They have some sort similarity textual threshold which cannot be applied universally</a:t>
+            </a:r>
+          </a:p>
+          <a:p>
+            <a:endParaRPr lang="en-US" dirty="0"/>
+          </a:p>
+          <a:p>
+            <a:r>
+              <a:rPr lang="en-US" dirty="0"/>
+              <a:t>- </a:t>
+            </a:r>
+            <a:r>
+              <a:rPr lang="en-US" dirty="0" err="1"/>
+              <a:t>RefDiff</a:t>
+            </a:r>
+            <a:r>
+              <a:rPr lang="en-US" dirty="0"/>
+              <a:t> 2.0 which is the only tool that supports JavaScript preserves . </a:t>
+            </a:r>
+            <a:endParaRPr lang="en-US" dirty="0">
               <a:cs typeface="Calibri"/>
             </a:endParaRPr>
           </a:p>
           <a:p>
             <a:r>
-              <a:rPr lang="en-US">
-                <a:cs typeface="Calibri"/>
-              </a:rPr>
-              <a:t>- Cannot detecting refactorings lower than container level</a:t>
-            </a:r>
-            <a:endParaRPr lang="en-US"/>
-          </a:p>
-          <a:p>
-            <a:r>
-              <a:rPr lang="en-US">
-                <a:cs typeface="Calibri"/>
-              </a:rPr>
-              <a:t>- They have some sort similarity textual threshold which cannot be applied universally</a:t>
-            </a:r>
-          </a:p>
-          <a:p>
-            <a:endParaRPr lang="en-US"/>
-          </a:p>
-          <a:p>
-            <a:r>
-              <a:rPr lang="en-US"/>
-              <a:t>- </a:t>
-            </a:r>
-            <a:r>
-              <a:rPr lang="en-US" err="1"/>
-              <a:t>RefDiff</a:t>
-            </a:r>
-            <a:r>
-              <a:rPr lang="en-US"/>
-              <a:t> 2.0 which is the only tool that supports JavaScript preserves . </a:t>
-            </a:r>
-            <a:endParaRPr lang="en-US">
+              <a:rPr lang="en-US" dirty="0"/>
+              <a:t>However, it represents containers as bag of tokens and do not have their structural location information, Therefore by DESIGN it cannot detect changes lower than container/ function level.</a:t>
+            </a:r>
+            <a:endParaRPr lang="en-US" dirty="0">
               <a:cs typeface="Calibri"/>
             </a:endParaRPr>
           </a:p>
           <a:p>
-            <a:r>
-              <a:rPr lang="en-US"/>
-              <a:t>However, it represents containers as bag of tokens and do not have their structural location information, Therefore by DESIGN it cannot detect changes lower than container/ function level.</a:t>
-            </a:r>
-            <a:endParaRPr lang="en-US">
+            <a:endParaRPr lang="en-US" dirty="0">
               <a:cs typeface="Calibri"/>
             </a:endParaRPr>
           </a:p>
           <a:p>
-            <a:endParaRPr lang="en-US">
-              <a:cs typeface="Calibri"/>
-            </a:endParaRPr>
-          </a:p>
-          <a:p>
-            <a:r>
-              <a:rPr lang="en-US">
-                <a:cs typeface="Calibri"/>
-              </a:rPr>
-              <a:t>On the other hand RefactoringMiner only supports Java</a:t>
+            <a:r>
+              <a:rPr lang="en-US" dirty="0">
+                <a:cs typeface="Calibri"/>
+              </a:rPr>
+              <a:t>On the other hand, RefactoringMiner only supports Java</a:t>
             </a:r>
           </a:p>
         </p:txBody>
@@ -7197,18 +6985,10 @@
           <a:lstStyle/>
           <a:p>
             <a:r>
-              <a:rPr lang="en-US">
+              <a:rPr lang="en-US" dirty="0">
                 <a:cs typeface="Calibri"/>
               </a:rPr>
               <a:t>Our main contributions are -</a:t>
-            </a:r>
-          </a:p>
-          <a:p>
-            <a:r>
-              <a:rPr lang="en-US">
-                <a:cs typeface="Calibri"/>
-              </a:rPr>
-              <a:t>-</a:t>
             </a:r>
           </a:p>
         </p:txBody>
@@ -7294,7 +7074,7 @@
           <a:lstStyle/>
           <a:p>
             <a:r>
-              <a:rPr lang="en-US">
+              <a:rPr lang="en-US" dirty="0">
                 <a:cs typeface="Calibri"/>
               </a:rPr>
               <a:t>Here is a brief overview how our tool works on a high level/</a:t>
@@ -7302,28 +7082,16 @@
           </a:p>
           <a:p>
             <a:r>
-              <a:rPr lang="en-US">
-                <a:cs typeface="Calibri"/>
-              </a:rPr>
-              <a:t>- </a:t>
-            </a:r>
-            <a:r>
-              <a:rPr lang="en-US" err="1">
-                <a:cs typeface="Calibri"/>
-              </a:rPr>
-              <a:t>JsDiffer</a:t>
-            </a:r>
-            <a:r>
-              <a:rPr lang="en-US">
-                <a:cs typeface="Calibri"/>
-              </a:rPr>
-              <a:t> takes any two programs which can come from commit, file or directories and then model them as composite pattern where </a:t>
-            </a:r>
-            <a:endParaRPr lang="en-US"/>
-          </a:p>
-          <a:p>
-            <a:r>
-              <a:rPr lang="en-US">
+              <a:rPr lang="en-US" dirty="0">
+                <a:cs typeface="Calibri"/>
+              </a:rPr>
+              <a:t>- JsDiffer takes any two programs which can come from commit, file or directories and then model them as composite pattern where </a:t>
+            </a:r>
+            <a:endParaRPr lang="en-US" dirty="0"/>
+          </a:p>
+          <a:p>
+            <a:r>
+              <a:rPr lang="en-US" dirty="0">
                 <a:cs typeface="Calibri"/>
               </a:rPr>
               <a:t>- Container elements such as function, class, or file can contain statements or another container </a:t>
@@ -7331,7 +7099,7 @@
           </a:p>
           <a:p>
             <a:r>
-              <a:rPr lang="en-US">
+              <a:rPr lang="en-US" dirty="0">
                 <a:cs typeface="Calibri"/>
               </a:rPr>
               <a:t>- For each leaf statement we  also preserve all the variables, literals, Method invocation and basically anything that appears in that statement</a:t>
@@ -7339,45 +7107,27 @@
           </a:p>
           <a:p>
             <a:r>
-              <a:rPr lang="en-US">
-                <a:cs typeface="Calibri"/>
-              </a:rPr>
-              <a:t>- Then The diff phase basically matches elements and some of the differences help us identify </a:t>
-            </a:r>
-            <a:r>
-              <a:rPr lang="en-US" err="1">
-                <a:cs typeface="Calibri"/>
-              </a:rPr>
-              <a:t>refactorings</a:t>
-            </a:r>
-          </a:p>
-          <a:p>
-            <a:endParaRPr lang="en-US">
+              <a:rPr lang="en-US" dirty="0">
+                <a:cs typeface="Calibri"/>
+              </a:rPr>
+              <a:t>- Then The diff phase basically matches elements and some of the differences help us identify refactorings</a:t>
+            </a:r>
+          </a:p>
+          <a:p>
+            <a:endParaRPr lang="en-US" dirty="0">
               <a:cs typeface="Calibri"/>
             </a:endParaRPr>
           </a:p>
           <a:p>
             <a:r>
-              <a:rPr lang="en-US">
-                <a:cs typeface="Calibri"/>
-              </a:rPr>
-              <a:t>Now I am going to </a:t>
-            </a:r>
-            <a:r>
-              <a:rPr lang="en-US" err="1">
-                <a:cs typeface="Calibri"/>
-              </a:rPr>
-              <a:t>foucs</a:t>
-            </a:r>
-            <a:r>
-              <a:rPr lang="en-US">
-                <a:cs typeface="Calibri"/>
-              </a:rPr>
-              <a:t> on the diff part particularly how the statements are matched </a:t>
-            </a:r>
-          </a:p>
-          <a:p>
-            <a:endParaRPr lang="en-US">
+              <a:rPr lang="en-US" dirty="0">
+                <a:cs typeface="Calibri"/>
+              </a:rPr>
+              <a:t>Now I am going to focus on the diff part particularly how the statements are matched </a:t>
+            </a:r>
+          </a:p>
+          <a:p>
+            <a:endParaRPr lang="en-US" dirty="0">
               <a:cs typeface="Calibri"/>
             </a:endParaRPr>
           </a:p>
@@ -7548,7 +7298,7 @@
           <a:p>
             <a:fld id="{846CE7D5-CF57-46EF-B807-FDD0502418D4}" type="datetimeFigureOut">
               <a:rPr lang="en-US" smtClean="0"/>
-              <a:t>11/2/2022</a:t>
+              <a:t>11/8/2022</a:t>
             </a:fld>
             <a:endParaRPr lang="en-US"/>
           </a:p>
@@ -7717,7 +7467,7 @@
           <a:p>
             <a:fld id="{846CE7D5-CF57-46EF-B807-FDD0502418D4}" type="datetimeFigureOut">
               <a:rPr lang="en-US" smtClean="0"/>
-              <a:t>11/2/2022</a:t>
+              <a:t>11/8/2022</a:t>
             </a:fld>
             <a:endParaRPr lang="en-US"/>
           </a:p>
@@ -7896,7 +7646,7 @@
           <a:p>
             <a:fld id="{846CE7D5-CF57-46EF-B807-FDD0502418D4}" type="datetimeFigureOut">
               <a:rPr lang="en-US" smtClean="0"/>
-              <a:t>11/2/2022</a:t>
+              <a:t>11/8/2022</a:t>
             </a:fld>
             <a:endParaRPr lang="en-US"/>
           </a:p>
@@ -8065,7 +7815,7 @@
           <a:p>
             <a:fld id="{846CE7D5-CF57-46EF-B807-FDD0502418D4}" type="datetimeFigureOut">
               <a:rPr lang="en-US" smtClean="0"/>
-              <a:t>11/2/2022</a:t>
+              <a:t>11/8/2022</a:t>
             </a:fld>
             <a:endParaRPr lang="en-US"/>
           </a:p>
@@ -8311,7 +8061,7 @@
           <a:p>
             <a:fld id="{846CE7D5-CF57-46EF-B807-FDD0502418D4}" type="datetimeFigureOut">
               <a:rPr lang="en-US" smtClean="0"/>
-              <a:t>11/2/2022</a:t>
+              <a:t>11/8/2022</a:t>
             </a:fld>
             <a:endParaRPr lang="en-US"/>
           </a:p>
@@ -8541,7 +8291,7 @@
           <a:p>
             <a:fld id="{846CE7D5-CF57-46EF-B807-FDD0502418D4}" type="datetimeFigureOut">
               <a:rPr lang="en-US" smtClean="0"/>
-              <a:t>11/2/2022</a:t>
+              <a:t>11/8/2022</a:t>
             </a:fld>
             <a:endParaRPr lang="en-US"/>
           </a:p>
@@ -8906,7 +8656,7 @@
           <a:p>
             <a:fld id="{846CE7D5-CF57-46EF-B807-FDD0502418D4}" type="datetimeFigureOut">
               <a:rPr lang="en-US" smtClean="0"/>
-              <a:t>11/2/2022</a:t>
+              <a:t>11/8/2022</a:t>
             </a:fld>
             <a:endParaRPr lang="en-US"/>
           </a:p>
@@ -9024,7 +8774,7 @@
           <a:p>
             <a:fld id="{846CE7D5-CF57-46EF-B807-FDD0502418D4}" type="datetimeFigureOut">
               <a:rPr lang="en-US" smtClean="0"/>
-              <a:t>11/2/2022</a:t>
+              <a:t>11/8/2022</a:t>
             </a:fld>
             <a:endParaRPr lang="en-US"/>
           </a:p>
@@ -9120,7 +8870,7 @@
           <a:p>
             <a:fld id="{846CE7D5-CF57-46EF-B807-FDD0502418D4}" type="datetimeFigureOut">
               <a:rPr lang="en-US" smtClean="0"/>
-              <a:t>11/2/2022</a:t>
+              <a:t>11/8/2022</a:t>
             </a:fld>
             <a:endParaRPr lang="en-US"/>
           </a:p>
@@ -9396,7 +9146,7 @@
           <a:p>
             <a:fld id="{846CE7D5-CF57-46EF-B807-FDD0502418D4}" type="datetimeFigureOut">
               <a:rPr lang="en-US" smtClean="0"/>
-              <a:t>11/2/2022</a:t>
+              <a:t>11/8/2022</a:t>
             </a:fld>
             <a:endParaRPr lang="en-US"/>
           </a:p>
@@ -9652,7 +9402,7 @@
           <a:p>
             <a:fld id="{846CE7D5-CF57-46EF-B807-FDD0502418D4}" type="datetimeFigureOut">
               <a:rPr lang="en-US" smtClean="0"/>
-              <a:t>11/2/2022</a:t>
+              <a:t>11/8/2022</a:t>
             </a:fld>
             <a:endParaRPr lang="en-US"/>
           </a:p>
@@ -9864,7 +9614,7 @@
           <a:p>
             <a:fld id="{846CE7D5-CF57-46EF-B807-FDD0502418D4}" type="datetimeFigureOut">
               <a:rPr lang="en-US" smtClean="0"/>
-              <a:t>11/2/2022</a:t>
+              <a:t>11/8/2022</a:t>
             </a:fld>
             <a:endParaRPr lang="en-US"/>
           </a:p>
@@ -13457,7 +13207,7 @@
               <a:buNone/>
             </a:pPr>
             <a:r>
-              <a:rPr lang="en-US" b="1">
+              <a:rPr lang="en-US" b="1" dirty="0">
                 <a:cs typeface="Calibri"/>
               </a:rPr>
               <a:t>Other differences</a:t>
@@ -13468,7 +13218,7 @@
               <a:buNone/>
             </a:pPr>
             <a:r>
-              <a:rPr lang="en-US">
+              <a:rPr lang="en-US" dirty="0">
                 <a:cs typeface="Calibri"/>
               </a:rPr>
               <a:t>- No Static Types (harder to match signatures)  </a:t>
@@ -13479,7 +13229,7 @@
               <a:buNone/>
             </a:pPr>
             <a:r>
-              <a:rPr lang="en-US">
+              <a:rPr lang="en-US" dirty="0">
                 <a:cs typeface="Calibri"/>
               </a:rPr>
               <a:t>- Function Variable Invocation</a:t>
@@ -13490,10 +13240,10 @@
               <a:buNone/>
             </a:pPr>
             <a:r>
-              <a:rPr lang="en-US">
-                <a:cs typeface="Calibri"/>
-              </a:rPr>
-              <a:t>- Statement not ending without semicolon</a:t>
+              <a:rPr lang="en-US" dirty="0">
+                <a:cs typeface="Calibri"/>
+              </a:rPr>
+              <a:t>- Statement not ending with semicolon</a:t>
             </a:r>
           </a:p>
           <a:p>
@@ -13501,7 +13251,7 @@
               <a:buNone/>
             </a:pPr>
             <a:r>
-              <a:rPr lang="en-US">
+              <a:rPr lang="en-US" dirty="0">
                 <a:cs typeface="Calibri"/>
               </a:rPr>
               <a:t>- Self Invoking Function</a:t>
@@ -13512,7 +13262,7 @@
               <a:buNone/>
             </a:pPr>
             <a:r>
-              <a:rPr lang="en-US">
+              <a:rPr lang="en-US" dirty="0">
                 <a:cs typeface="Calibri"/>
               </a:rPr>
               <a:t>- Returned Function Invocation</a:t>
@@ -13524,7 +13274,7 @@
               <a:buChar char="-"/>
             </a:pPr>
             <a:r>
-              <a:rPr lang="en-US">
+              <a:rPr lang="en-US" dirty="0">
                 <a:cs typeface="Calibri"/>
               </a:rPr>
               <a:t>Default value in parameter</a:t>
@@ -13536,11 +13286,38 @@
               <a:buChar char="-"/>
             </a:pPr>
             <a:r>
-              <a:rPr lang="en-US">
-                <a:cs typeface="Calibri"/>
-              </a:rPr>
-              <a:t>Array and Object property access syntax</a:t>
-            </a:r>
+              <a:rPr lang="en-US" b="0" i="0" dirty="0">
+                <a:solidFill>
+                  <a:srgbClr val="1B1B1B"/>
+                </a:solidFill>
+                <a:effectLst/>
+                <a:latin typeface="Inter"/>
+              </a:rPr>
+              <a:t> </a:t>
+            </a:r>
+            <a:r>
+              <a:rPr lang="en-US" b="0" i="0" dirty="0" err="1">
+                <a:solidFill>
+                  <a:srgbClr val="1B1B1B"/>
+                </a:solidFill>
+                <a:effectLst/>
+                <a:latin typeface="Inter"/>
+              </a:rPr>
+              <a:t>Destructuring</a:t>
+            </a:r>
+            <a:r>
+              <a:rPr lang="en-US" b="0" i="0">
+                <a:solidFill>
+                  <a:srgbClr val="1B1B1B"/>
+                </a:solidFill>
+                <a:effectLst/>
+                <a:latin typeface="Inter"/>
+              </a:rPr>
+              <a:t> Assignment</a:t>
+            </a:r>
+            <a:endParaRPr lang="en-US" dirty="0">
+              <a:cs typeface="Calibri"/>
+            </a:endParaRPr>
           </a:p>
         </p:txBody>
       </p:sp>
@@ -13635,10 +13412,10 @@
       </p:pic>
       <p:pic>
         <p:nvPicPr>
-          <p:cNvPr id="14" name="Picture 13">
+          <p:cNvPr id="18" name="Picture 17">
             <a:extLst>
               <a:ext uri="{FF2B5EF4-FFF2-40B4-BE49-F238E27FC236}">
-                <a16:creationId xmlns:a16="http://schemas.microsoft.com/office/drawing/2014/main" id="{F77839DC-9FBA-28DA-FE6B-CBD906B0D7E7}"/>
+                <a16:creationId xmlns:a16="http://schemas.microsoft.com/office/drawing/2014/main" id="{CB9D77ED-9452-D45C-BA8E-85E4FBD685A8}"/>
               </a:ext>
             </a:extLst>
           </p:cNvPr>
@@ -13655,8 +13432,8 @@
         </p:blipFill>
         <p:spPr>
           <a:xfrm>
-            <a:off x="4518498" y="4001294"/>
-            <a:ext cx="3171750" cy="318560"/>
+            <a:off x="7277531" y="5455216"/>
+            <a:ext cx="4217139" cy="406798"/>
           </a:xfrm>
           <a:prstGeom prst="rect">
             <a:avLst/>
@@ -13665,10 +13442,10 @@
       </p:pic>
       <p:pic>
         <p:nvPicPr>
-          <p:cNvPr id="16" name="Picture 15">
+          <p:cNvPr id="6" name="Picture 5">
             <a:extLst>
               <a:ext uri="{FF2B5EF4-FFF2-40B4-BE49-F238E27FC236}">
-                <a16:creationId xmlns:a16="http://schemas.microsoft.com/office/drawing/2014/main" id="{602DAFCE-70DC-0D27-68E0-CC24823FB37F}"/>
+                <a16:creationId xmlns:a16="http://schemas.microsoft.com/office/drawing/2014/main" id="{5E2F3A94-EAB2-CE4D-9439-EFF8D59BA6E9}"/>
               </a:ext>
             </a:extLst>
           </p:cNvPr>
@@ -13685,8 +13462,8 @@
         </p:blipFill>
         <p:spPr>
           <a:xfrm>
-            <a:off x="5074830" y="5015599"/>
-            <a:ext cx="3171750" cy="345736"/>
+            <a:off x="4408005" y="3980134"/>
+            <a:ext cx="3838575" cy="314325"/>
           </a:xfrm>
           <a:prstGeom prst="rect">
             <a:avLst/>
@@ -13695,10 +13472,10 @@
       </p:pic>
       <p:pic>
         <p:nvPicPr>
-          <p:cNvPr id="18" name="Picture 17">
+          <p:cNvPr id="9" name="Picture 8">
             <a:extLst>
               <a:ext uri="{FF2B5EF4-FFF2-40B4-BE49-F238E27FC236}">
-                <a16:creationId xmlns:a16="http://schemas.microsoft.com/office/drawing/2014/main" id="{CB9D77ED-9452-D45C-BA8E-85E4FBD685A8}"/>
+                <a16:creationId xmlns:a16="http://schemas.microsoft.com/office/drawing/2014/main" id="{F3F840A2-64F8-74FB-84CB-23EA8CD20DF6}"/>
               </a:ext>
             </a:extLst>
           </p:cNvPr>
@@ -13715,8 +13492,8 @@
         </p:blipFill>
         <p:spPr>
           <a:xfrm>
-            <a:off x="7277531" y="5455216"/>
-            <a:ext cx="4217139" cy="406798"/>
+            <a:off x="5037201" y="5019836"/>
+            <a:ext cx="4019550" cy="352425"/>
           </a:xfrm>
           <a:prstGeom prst="rect">
             <a:avLst/>
@@ -21264,15 +21041,6 @@
 </file>
 
 <file path=customXml/item1.xml><?xml version="1.0" encoding="utf-8"?>
-<?mso-contentType ?>
-<FormTemplates xmlns="http://schemas.microsoft.com/sharepoint/v3/contenttype/forms">
-  <Display>DocumentLibraryForm</Display>
-  <Edit>DocumentLibraryForm</Edit>
-  <New>DocumentLibraryForm</New>
-</FormTemplates>
-</file>
-
-<file path=customXml/item2.xml><?xml version="1.0" encoding="utf-8"?>
 <ct:contentTypeSchema xmlns:ct="http://schemas.microsoft.com/office/2006/metadata/contentType" xmlns:ma="http://schemas.microsoft.com/office/2006/metadata/properties/metaAttributes" ct:_="" ma:_="" ma:contentTypeName="Document" ma:contentTypeID="0x010100C27A93EFDC10E3488A33C945DF7A9192" ma:contentTypeVersion="7" ma:contentTypeDescription="Create a new document." ma:contentTypeScope="" ma:versionID="c8c9bf54b15fa2bda8fbf33928298432">
   <xsd:schema xmlns:xsd="http://www.w3.org/2001/XMLSchema" xmlns:xs="http://www.w3.org/2001/XMLSchema" xmlns:p="http://schemas.microsoft.com/office/2006/metadata/properties" xmlns:ns3="ebaa86fa-0f72-406a-89ee-fd7bc463b854" xmlns:ns4="7f2e9108-fca1-4eef-9e16-a394e6fc760f" targetNamespace="http://schemas.microsoft.com/office/2006/metadata/properties" ma:root="true" ma:fieldsID="fa626e449315e8d2fe397d2deea23dd4" ns3:_="" ns4:_="">
     <xsd:import namespace="ebaa86fa-0f72-406a-89ee-fd7bc463b854"/>
@@ -21457,6 +21225,15 @@
 </ct:contentTypeSchema>
 </file>
 
+<file path=customXml/item2.xml><?xml version="1.0" encoding="utf-8"?>
+<?mso-contentType ?>
+<FormTemplates xmlns="http://schemas.microsoft.com/sharepoint/v3/contenttype/forms">
+  <Display>DocumentLibraryForm</Display>
+  <Edit>DocumentLibraryForm</Edit>
+  <New>DocumentLibraryForm</New>
+</FormTemplates>
+</file>
+
 <file path=customXml/item3.xml><?xml version="1.0" encoding="utf-8"?>
 <p:properties xmlns:p="http://schemas.microsoft.com/office/2006/metadata/properties" xmlns:xsi="http://www.w3.org/2001/XMLSchema-instance" xmlns:pc="http://schemas.microsoft.com/office/infopath/2007/PartnerControls">
   <documentManagement/>
@@ -21464,14 +21241,6 @@
 </file>
 
 <file path=customXml/itemProps1.xml><?xml version="1.0" encoding="utf-8"?>
-<ds:datastoreItem xmlns:ds="http://schemas.openxmlformats.org/officeDocument/2006/customXml" ds:itemID="{0D05E828-6427-4207-965E-26AB76074BB1}">
-  <ds:schemaRefs>
-    <ds:schemaRef ds:uri="http://schemas.microsoft.com/sharepoint/v3/contenttype/forms"/>
-  </ds:schemaRefs>
-</ds:datastoreItem>
-</file>
-
-<file path=customXml/itemProps2.xml><?xml version="1.0" encoding="utf-8"?>
 <ds:datastoreItem xmlns:ds="http://schemas.openxmlformats.org/officeDocument/2006/customXml" ds:itemID="{0D860BA7-378A-4A7A-BF52-1E26CC8AB36E}">
   <ds:schemaRefs>
     <ds:schemaRef ds:uri="7f2e9108-fca1-4eef-9e16-a394e6fc760f"/>
@@ -21486,6 +21255,14 @@
     <ds:schemaRef ds:uri="http://schemas.microsoft.com/office/infopath/2007/PartnerControls"/>
     <ds:schemaRef ds:uri="http://schemas.openxmlformats.org/package/2006/metadata/core-properties"/>
     <ds:schemaRef ds:uri="http://www.w3.org/2001/XMLSchema"/>
+  </ds:schemaRefs>
+</ds:datastoreItem>
+</file>
+
+<file path=customXml/itemProps2.xml><?xml version="1.0" encoding="utf-8"?>
+<ds:datastoreItem xmlns:ds="http://schemas.openxmlformats.org/officeDocument/2006/customXml" ds:itemID="{0D05E828-6427-4207-965E-26AB76074BB1}">
+  <ds:schemaRefs>
+    <ds:schemaRef ds:uri="http://schemas.microsoft.com/sharepoint/v3/contenttype/forms"/>
   </ds:schemaRefs>
 </ds:datastoreItem>
 </file>

</xml_diff>